<commit_message>
modified:   NEW.pdf 	modified:   NEW.pptx 	deleted:    final draft report.pdf
</commit_message>
<xml_diff>
--- a/NEW.pptx
+++ b/NEW.pptx
@@ -8173,25 +8173,7 @@
                 </a:solidFill>
                 <a:latin typeface="Bahnschrift Light Condensed" panose="020B0502040204020203" pitchFamily="34" charset="0"/>
               </a:rPr>
-              <a:t>2.1.  What </a:t>
-            </a:r>
-            <a:r>
-              <a:rPr lang="en-US" sz="2000" b="1" u="sng" dirty="0" smtClean="0">
-                <a:solidFill>
-                  <a:schemeClr val="tx1"/>
-                </a:solidFill>
-                <a:latin typeface="Bahnschrift Light Condensed" panose="020B0502040204020203" pitchFamily="34" charset="0"/>
-              </a:rPr>
-              <a:t>is ”zero trust security</a:t>
-            </a:r>
-            <a:r>
-              <a:rPr lang="en-US" sz="2000" b="1" u="sng" dirty="0" smtClean="0">
-                <a:solidFill>
-                  <a:schemeClr val="tx1"/>
-                </a:solidFill>
-                <a:latin typeface="Bahnschrift Light Condensed" panose="020B0502040204020203" pitchFamily="34" charset="0"/>
-              </a:rPr>
-              <a:t>”?</a:t>
+              <a:t>2.1.  What is ”zero trust security”?</a:t>
             </a:r>
           </a:p>
           <a:p>
@@ -9006,16 +8988,7 @@
                 </a:solidFill>
                 <a:latin typeface="Bahnschrift SemiBold Condensed" panose="020B0502040204020203" pitchFamily="34" charset="0"/>
               </a:rPr>
-              <a:t>2.2 </a:t>
-            </a:r>
-            <a:r>
-              <a:rPr lang="en-US" sz="1800" b="1" u="sng" dirty="0" smtClean="0">
-                <a:solidFill>
-                  <a:schemeClr val="tx1"/>
-                </a:solidFill>
-                <a:latin typeface="Bahnschrift SemiBold Condensed" panose="020B0502040204020203" pitchFamily="34" charset="0"/>
-              </a:rPr>
-              <a:t>.  PRINCIPLES OF ZERO TRUST SECURITY</a:t>
+              <a:t>2.2 .  PRINCIPLES OF ZERO TRUST SECURITY</a:t>
             </a:r>
           </a:p>
           <a:p>
@@ -13221,19 +13194,7 @@
               <a:rPr lang="en-US" sz="1600" u="sng" dirty="0" smtClean="0">
                 <a:latin typeface="Bahnschrift SemiBold" panose="020B0502040204020203" pitchFamily="34" charset="0"/>
               </a:rPr>
-              <a:t>5. </a:t>
-            </a:r>
-            <a:r>
-              <a:rPr lang="en-US" sz="1600" u="sng" dirty="0" smtClean="0">
-                <a:latin typeface="Bahnschrift SemiBold" panose="020B0502040204020203" pitchFamily="34" charset="0"/>
-              </a:rPr>
-              <a:t> ADVANTAGES </a:t>
-            </a:r>
-            <a:r>
-              <a:rPr lang="en-US" sz="1600" u="sng" dirty="0" smtClean="0">
-                <a:latin typeface="Bahnschrift SemiBold" panose="020B0502040204020203" pitchFamily="34" charset="0"/>
-              </a:rPr>
-              <a:t>OF ZERO TRUST SECURITY </a:t>
+              <a:t>5.  ADVANTAGES OF ZERO TRUST SECURITY </a:t>
             </a:r>
           </a:p>
           <a:p>
@@ -13960,7 +13921,7 @@
         <p:spPr>
           <a:xfrm>
             <a:off x="383059" y="6221237"/>
-            <a:ext cx="7006281" cy="954107"/>
+            <a:ext cx="7006281" cy="1077218"/>
           </a:xfrm>
           <a:prstGeom prst="rect">
             <a:avLst/>
@@ -13975,67 +13936,67 @@
           <a:p>
             <a:pPr algn="just"/>
             <a:r>
-              <a:rPr lang="en-US" dirty="0">
+              <a:rPr lang="en-US" sz="1600" dirty="0">
                 <a:latin typeface="Berlin Sans FB" panose="020E0602020502020306" pitchFamily="34" charset="0"/>
               </a:rPr>
               <a:t>This is to certify that the seminar entitled “ZERO TRUST </a:t>
             </a:r>
             <a:r>
-              <a:rPr lang="en-US" dirty="0" smtClean="0">
+              <a:rPr lang="en-US" sz="1600" dirty="0" smtClean="0">
                 <a:latin typeface="Berlin Sans FB" panose="020E0602020502020306" pitchFamily="34" charset="0"/>
               </a:rPr>
               <a:t>SECURITY” </a:t>
             </a:r>
             <a:r>
-              <a:rPr lang="en-US" dirty="0">
+              <a:rPr lang="en-US" sz="1600" dirty="0">
                 <a:latin typeface="Berlin Sans FB" panose="020E0602020502020306" pitchFamily="34" charset="0"/>
               </a:rPr>
               <a:t>is submitted </a:t>
             </a:r>
             <a:r>
-              <a:rPr lang="en-US" dirty="0" smtClean="0">
+              <a:rPr lang="en-US" sz="1600" dirty="0" smtClean="0">
                 <a:latin typeface="Berlin Sans FB" panose="020E0602020502020306" pitchFamily="34" charset="0"/>
               </a:rPr>
               <a:t>by </a:t>
             </a:r>
             <a:r>
-              <a:rPr lang="en-US" dirty="0">
+              <a:rPr lang="en-US" sz="1600" dirty="0">
                 <a:latin typeface="Berlin Sans FB" panose="020E0602020502020306" pitchFamily="34" charset="0"/>
               </a:rPr>
               <a:t>MELWIN JOSHY bearing </a:t>
             </a:r>
             <a:r>
-              <a:rPr lang="en-US" dirty="0" smtClean="0">
+              <a:rPr lang="en-US" sz="1600" dirty="0" smtClean="0">
                 <a:latin typeface="Berlin Sans FB" panose="020E0602020502020306" pitchFamily="34" charset="0"/>
               </a:rPr>
               <a:t>Reg_No</a:t>
             </a:r>
             <a:r>
-              <a:rPr lang="en-US" dirty="0">
+              <a:rPr lang="en-US" sz="1600" dirty="0">
                 <a:latin typeface="Berlin Sans FB" panose="020E0602020502020306" pitchFamily="34" charset="0"/>
               </a:rPr>
               <a:t>. 2201133041 in partial fulfilment of the requirement for the award </a:t>
             </a:r>
             <a:r>
-              <a:rPr lang="en-US" dirty="0" smtClean="0">
+              <a:rPr lang="en-US" sz="1600" dirty="0" smtClean="0">
                 <a:latin typeface="Berlin Sans FB" panose="020E0602020502020306" pitchFamily="34" charset="0"/>
               </a:rPr>
               <a:t>of </a:t>
             </a:r>
             <a:r>
-              <a:rPr lang="en-US" dirty="0">
+              <a:rPr lang="en-US" sz="1600" dirty="0">
                 <a:latin typeface="Berlin Sans FB" panose="020E0602020502020306" pitchFamily="34" charset="0"/>
               </a:rPr>
               <a:t>the Diploma in Computer Engineering of State Board of Technical Examinations, Kerala for </a:t>
             </a:r>
             <a:r>
-              <a:rPr lang="en-US" dirty="0" smtClean="0">
+              <a:rPr lang="en-US" sz="1600" dirty="0" smtClean="0">
                 <a:latin typeface="Berlin Sans FB" panose="020E0602020502020306" pitchFamily="34" charset="0"/>
               </a:rPr>
               <a:t>the </a:t>
             </a:r>
             <a:r>
-              <a:rPr lang="en-IN" dirty="0">
+              <a:rPr lang="en-IN" sz="1600" dirty="0">
                 <a:latin typeface="Berlin Sans FB" panose="020E0602020502020306" pitchFamily="34" charset="0"/>
               </a:rPr>
               <a:t>academic year 2024-2025.</a:t>
@@ -15256,19 +15217,7 @@
               <a:rPr lang="en-US" sz="1600" u="sng" dirty="0" smtClean="0">
                 <a:latin typeface="Bahnschrift SemiBold" panose="020B0502040204020203" pitchFamily="34" charset="0"/>
               </a:rPr>
-              <a:t>6</a:t>
-            </a:r>
-            <a:r>
-              <a:rPr lang="en-US" sz="1600" u="sng" dirty="0" smtClean="0">
-                <a:latin typeface="Bahnschrift SemiBold" panose="020B0502040204020203" pitchFamily="34" charset="0"/>
-              </a:rPr>
-              <a:t>.  </a:t>
-            </a:r>
-            <a:r>
-              <a:rPr lang="en-US" sz="1600" u="sng" dirty="0" smtClean="0">
-                <a:latin typeface="Bahnschrift SemiBold" panose="020B0502040204020203" pitchFamily="34" charset="0"/>
-              </a:rPr>
-              <a:t>DISADVANTAGES </a:t>
+              <a:t>6.  DISADVANTAGES </a:t>
             </a:r>
             <a:r>
               <a:rPr lang="en-US" sz="1600" u="sng" dirty="0">
@@ -15944,13 +15893,7 @@
               <a:rPr lang="en-US" sz="1600" u="sng" dirty="0" smtClean="0">
                 <a:latin typeface="Bahnschrift SemiBold" panose="020B0502040204020203" pitchFamily="34" charset="0"/>
               </a:rPr>
-              <a:t>7. </a:t>
-            </a:r>
-            <a:r>
-              <a:rPr lang="en-US" sz="1600" u="sng" dirty="0" smtClean="0">
-                <a:latin typeface="Bahnschrift SemiBold" panose="020B0502040204020203" pitchFamily="34" charset="0"/>
-              </a:rPr>
-              <a:t> FUTURE SCOPE</a:t>
+              <a:t>7.  FUTURE SCOPE</a:t>
             </a:r>
           </a:p>
           <a:p>
@@ -16541,9 +16484,6 @@
               </a:rPr>
               <a:t>8.  CONCLUSION</a:t>
             </a:r>
-            <a:endParaRPr lang="en-US" sz="1600" u="sng" dirty="0" smtClean="0">
-              <a:latin typeface="Bahnschrift SemiBold" panose="020B0502040204020203" pitchFamily="34" charset="0"/>
-            </a:endParaRPr>
           </a:p>
           <a:p>
             <a:pPr marL="285750" indent="-285750" algn="just">
@@ -18115,31 +18055,13 @@
               <a:t>heartfelt gratitude to my seminar guide </a:t>
             </a:r>
             <a:r>
-              <a:rPr lang="en-US" sz="1600" dirty="0" err="1" smtClean="0">
+              <a:rPr lang="en-US" sz="1600" dirty="0" smtClean="0">
                 <a:solidFill>
                   <a:schemeClr val="tx1"/>
                 </a:solidFill>
                 <a:latin typeface="Bahnschrift Light" panose="020B0502040204020203" pitchFamily="34" charset="0"/>
               </a:rPr>
-              <a:t>Mrs.THAJBI</a:t>
-            </a:r>
-            <a:r>
-              <a:rPr lang="en-US" sz="1600" dirty="0" smtClean="0">
-                <a:solidFill>
-                  <a:schemeClr val="tx1"/>
-                </a:solidFill>
-                <a:latin typeface="Bahnschrift Light" panose="020B0502040204020203" pitchFamily="34" charset="0"/>
-              </a:rPr>
-              <a:t> </a:t>
-            </a:r>
-            <a:r>
-              <a:rPr lang="en-US" sz="1600" dirty="0" smtClean="0">
-                <a:solidFill>
-                  <a:schemeClr val="tx1"/>
-                </a:solidFill>
-                <a:latin typeface="Bahnschrift Light" panose="020B0502040204020203" pitchFamily="34" charset="0"/>
-              </a:rPr>
-              <a:t>P.M, Head </a:t>
+              <a:t>Mrs.THAJBI P.M, Head </a:t>
             </a:r>
             <a:r>
               <a:rPr lang="en-US" sz="1600" dirty="0">
@@ -20500,7 +20422,6 @@
               <a:rPr lang="en-US" dirty="0" smtClean="0"/>
               <a:t>12</a:t>
             </a:r>
-            <a:endParaRPr lang="en-US" dirty="0" smtClean="0"/>
           </a:p>
           <a:p>
             <a:pPr algn="ctr"/>
@@ -22239,12 +22160,6 @@
               </a:rPr>
               <a:t> CYBER SECURITY</a:t>
             </a:r>
-            <a:endParaRPr lang="en-US" sz="2000" u="sng" dirty="0" smtClean="0">
-              <a:solidFill>
-                <a:schemeClr val="tx1"/>
-              </a:solidFill>
-              <a:latin typeface="Impact" panose="020B0806030902050204" pitchFamily="34" charset="0"/>
-            </a:endParaRPr>
           </a:p>
           <a:p>
             <a:pPr algn="ctr"/>
@@ -22303,16 +22218,7 @@
                 </a:solidFill>
                 <a:latin typeface="Bahnschrift Light Condensed" panose="020B0502040204020203" pitchFamily="34" charset="0"/>
               </a:rPr>
-              <a:t>Cyber security </a:t>
-            </a:r>
-            <a:r>
-              <a:rPr lang="en-US" sz="1600" dirty="0" smtClean="0">
-                <a:solidFill>
-                  <a:schemeClr val="tx1"/>
-                </a:solidFill>
-                <a:latin typeface="Bahnschrift Light Condensed" panose="020B0502040204020203" pitchFamily="34" charset="0"/>
-              </a:rPr>
-              <a:t>covers a variety of vulnerabilities that occurs when a user is scouring through the network. Some of the key components are:</a:t>
+              <a:t>Cyber security covers a variety of vulnerabilities that occurs when a user is scouring through the network. Some of the key components are:</a:t>
             </a:r>
           </a:p>
           <a:p>
@@ -23025,12 +22931,6 @@
               </a:rPr>
               <a:t> CYBER SECURITY MODELS</a:t>
             </a:r>
-            <a:endParaRPr lang="en-US" sz="2000" u="sng" dirty="0" smtClean="0">
-              <a:solidFill>
-                <a:schemeClr val="tx1"/>
-              </a:solidFill>
-              <a:latin typeface="Impact" panose="020B0806030902050204" pitchFamily="34" charset="0"/>
-            </a:endParaRPr>
           </a:p>
           <a:p>
             <a:pPr algn="ctr"/>
@@ -23320,12 +23220,6 @@
               </a:rPr>
               <a:t>This model is designed to maintain data integrity. It prevents data from being modified by unauthorized users and ensures that data flows correctly from one level to another. The Biba Model uses a set of rules opposite to Bell-LaPadula, focusing on preventing unauthorized modification of data. Users can write data only at or below their integrity level (no write up) and read data at or above their integrity level (no read down).</a:t>
             </a:r>
-            <a:endParaRPr lang="en-US" sz="1600" dirty="0">
-              <a:solidFill>
-                <a:schemeClr val="tx1"/>
-              </a:solidFill>
-              <a:latin typeface="Bahnschrift Light Condensed" panose="020B0502040204020203" pitchFamily="34" charset="0"/>
-            </a:endParaRPr>
           </a:p>
           <a:p>
             <a:pPr marL="285750" indent="-285750" algn="just">
@@ -24900,14 +24794,6 @@
 </file>
 
 <file path=customXml/item1.xml><?xml version="1.0" encoding="utf-8"?>
-<p:properties xmlns:p="http://schemas.microsoft.com/office/2006/metadata/properties" xmlns:xsi="http://www.w3.org/2001/XMLSchema-instance" xmlns:pc="http://schemas.microsoft.com/office/infopath/2007/PartnerControls">
-  <documentManagement>
-    <MediaServiceKeyPoints xmlns="71af3243-3dd4-4a8d-8c0d-dd76da1f02a5" xsi:nil="true"/>
-  </documentManagement>
-</p:properties>
-</file>
-
-<file path=customXml/item2.xml><?xml version="1.0" encoding="utf-8"?>
 <ct:contentTypeSchema xmlns:ct="http://schemas.microsoft.com/office/2006/metadata/contentType" xmlns:ma="http://schemas.microsoft.com/office/2006/metadata/properties/metaAttributes" ct:_="" ma:_="" ma:contentTypeName="Document" ma:contentTypeID="0x01010079F111ED35F8CC479449609E8A0923A6" ma:contentTypeVersion="11" ma:contentTypeDescription="Create a new document." ma:contentTypeScope="" ma:versionID="96291512c1ee715ab617f4c07df79fc1">
   <xsd:schema xmlns:xsd="http://www.w3.org/2001/XMLSchema" xmlns:xs="http://www.w3.org/2001/XMLSchema" xmlns:p="http://schemas.microsoft.com/office/2006/metadata/properties" xmlns:ns2="71af3243-3dd4-4a8d-8c0d-dd76da1f02a5" xmlns:ns3="16c05727-aa75-4e4a-9b5f-8a80a1165891" targetNamespace="http://schemas.microsoft.com/office/2006/metadata/properties" ma:root="true" ma:fieldsID="8256c27c40ca5c40ce1cf6c44f0205df" ns2:_="" ns3:_="">
     <xsd:import namespace="71af3243-3dd4-4a8d-8c0d-dd76da1f02a5"/>
@@ -25118,6 +25004,14 @@
 </ct:contentTypeSchema>
 </file>
 
+<file path=customXml/item2.xml><?xml version="1.0" encoding="utf-8"?>
+<p:properties xmlns:p="http://schemas.microsoft.com/office/2006/metadata/properties" xmlns:xsi="http://www.w3.org/2001/XMLSchema-instance" xmlns:pc="http://schemas.microsoft.com/office/infopath/2007/PartnerControls">
+  <documentManagement>
+    <MediaServiceKeyPoints xmlns="71af3243-3dd4-4a8d-8c0d-dd76da1f02a5" xsi:nil="true"/>
+  </documentManagement>
+</p:properties>
+</file>
+
 <file path=customXml/item3.xml><?xml version="1.0" encoding="utf-8"?>
 <?mso-contentType ?>
 <FormTemplates xmlns="http://schemas.microsoft.com/sharepoint/v3/contenttype/forms">
@@ -25128,23 +25022,6 @@
 </file>
 
 <file path=customXml/itemProps1.xml><?xml version="1.0" encoding="utf-8"?>
-<ds:datastoreItem xmlns:ds="http://schemas.openxmlformats.org/officeDocument/2006/customXml" ds:itemID="{8503EBB4-024F-47DB-973C-8577E021001A}">
-  <ds:schemaRefs>
-    <ds:schemaRef ds:uri="http://schemas.microsoft.com/office/2006/metadata/properties"/>
-    <ds:schemaRef ds:uri="http://schemas.microsoft.com/office/2006/documentManagement/types"/>
-    <ds:schemaRef ds:uri="http://purl.org/dc/elements/1.1/"/>
-    <ds:schemaRef ds:uri="http://www.w3.org/XML/1998/namespace"/>
-    <ds:schemaRef ds:uri="http://purl.org/dc/dcmitype/"/>
-    <ds:schemaRef ds:uri="16c05727-aa75-4e4a-9b5f-8a80a1165891"/>
-    <ds:schemaRef ds:uri="71af3243-3dd4-4a8d-8c0d-dd76da1f02a5"/>
-    <ds:schemaRef ds:uri="http://schemas.microsoft.com/office/infopath/2007/PartnerControls"/>
-    <ds:schemaRef ds:uri="http://schemas.openxmlformats.org/package/2006/metadata/core-properties"/>
-    <ds:schemaRef ds:uri="http://purl.org/dc/terms/"/>
-  </ds:schemaRefs>
-</ds:datastoreItem>
-</file>
-
-<file path=customXml/itemProps2.xml><?xml version="1.0" encoding="utf-8"?>
 <ds:datastoreItem xmlns:ds="http://schemas.openxmlformats.org/officeDocument/2006/customXml" ds:itemID="{A758B2A1-0516-4926-B3DE-9B57AF31CF9B}">
   <ds:schemaRefs>
     <ds:schemaRef ds:uri="http://schemas.microsoft.com/office/2006/metadata/contentType"/>
@@ -25163,6 +25040,23 @@
 </ds:datastoreItem>
 </file>
 
+<file path=customXml/itemProps2.xml><?xml version="1.0" encoding="utf-8"?>
+<ds:datastoreItem xmlns:ds="http://schemas.openxmlformats.org/officeDocument/2006/customXml" ds:itemID="{8503EBB4-024F-47DB-973C-8577E021001A}">
+  <ds:schemaRefs>
+    <ds:schemaRef ds:uri="http://schemas.microsoft.com/office/2006/documentManagement/types"/>
+    <ds:schemaRef ds:uri="http://www.w3.org/XML/1998/namespace"/>
+    <ds:schemaRef ds:uri="http://schemas.microsoft.com/office/2006/metadata/properties"/>
+    <ds:schemaRef ds:uri="71af3243-3dd4-4a8d-8c0d-dd76da1f02a5"/>
+    <ds:schemaRef ds:uri="http://purl.org/dc/elements/1.1/"/>
+    <ds:schemaRef ds:uri="http://purl.org/dc/terms/"/>
+    <ds:schemaRef ds:uri="http://purl.org/dc/dcmitype/"/>
+    <ds:schemaRef ds:uri="http://schemas.microsoft.com/office/infopath/2007/PartnerControls"/>
+    <ds:schemaRef ds:uri="http://schemas.openxmlformats.org/package/2006/metadata/core-properties"/>
+    <ds:schemaRef ds:uri="16c05727-aa75-4e4a-9b5f-8a80a1165891"/>
+  </ds:schemaRefs>
+</ds:datastoreItem>
+</file>
+
 <file path=customXml/itemProps3.xml><?xml version="1.0" encoding="utf-8"?>
 <ds:datastoreItem xmlns:ds="http://schemas.openxmlformats.org/officeDocument/2006/customXml" ds:itemID="{276FF186-BD25-4F7E-9998-C208B3ECEBE3}">
   <ds:schemaRefs>

</xml_diff>